<commit_message>
Fix link and typo in Demo 3 slide deck
</commit_message>
<xml_diff>
--- a/03 msgraphpclient.pptx
+++ b/03 msgraphpclient.pptx
@@ -278,7 +278,7 @@
               <a:rPr lang="en-US" smtClean="0">
                 <a:latin typeface="Segoe UI" pitchFamily="34" charset="0"/>
               </a:rPr>
-              <a:t>1/7/19 3:41 PM</a:t>
+              <a:t>3/9/2019 6:35 AM</a:t>
             </a:fld>
             <a:endParaRPr lang="en-US" dirty="0">
               <a:latin typeface="Segoe UI" pitchFamily="34" charset="0"/>
@@ -575,7 +575,7 @@
           <a:p>
             <a:fld id="{D18B56EA-E28F-4F92-9F16-7A6F2501B303}" type="datetime8">
               <a:rPr lang="en-US" smtClean="0"/>
-              <a:t>1/7/19 3:41 PM</a:t>
+              <a:t>3/9/2019 6:35 AM</a:t>
             </a:fld>
             <a:endParaRPr lang="en-US" dirty="0"/>
           </a:p>
@@ -958,7 +958,7 @@
           <a:p>
             <a:fld id="{D18B56EA-E28F-4F92-9F16-7A6F2501B303}" type="datetime8">
               <a:rPr lang="en-US" smtClean="0"/>
-              <a:t>1/7/19 3:41 PM</a:t>
+              <a:t>3/9/2019 6:35 AM</a:t>
             </a:fld>
             <a:endParaRPr lang="en-US" dirty="0"/>
           </a:p>
@@ -1139,7 +1139,7 @@
           <a:p>
             <a:fld id="{D18B56EA-E28F-4F92-9F16-7A6F2501B303}" type="datetime8">
               <a:rPr lang="en-US" smtClean="0"/>
-              <a:t>1/7/19 3:41 PM</a:t>
+              <a:t>3/9/2019 6:35 AM</a:t>
             </a:fld>
             <a:endParaRPr lang="en-US" dirty="0"/>
           </a:p>
@@ -1320,7 +1320,7 @@
           <a:p>
             <a:fld id="{D18B56EA-E28F-4F92-9F16-7A6F2501B303}" type="datetime8">
               <a:rPr lang="en-US" smtClean="0"/>
-              <a:t>1/7/19 3:41 PM</a:t>
+              <a:t>3/9/2019 6:35 AM</a:t>
             </a:fld>
             <a:endParaRPr lang="en-US" dirty="0"/>
           </a:p>
@@ -1501,7 +1501,7 @@
           <a:p>
             <a:fld id="{D18B56EA-E28F-4F92-9F16-7A6F2501B303}" type="datetime8">
               <a:rPr lang="en-US" smtClean="0"/>
-              <a:t>1/7/19 3:41 PM</a:t>
+              <a:t>3/9/2019 6:35 AM</a:t>
             </a:fld>
             <a:endParaRPr lang="en-US" dirty="0"/>
           </a:p>
@@ -1774,7 +1774,7 @@
                 <a:tabLst/>
                 <a:defRPr/>
               </a:pPr>
-              <a:t>1/7/19</a:t>
+              <a:t>3/9/2019</a:t>
             </a:fld>
             <a:endParaRPr kumimoji="0" lang="en-US" sz="1800" b="0" i="0" u="none" strike="noStrike" kern="0" cap="none" spc="0" normalizeH="0" baseline="0" noProof="0" dirty="0">
               <a:ln>
@@ -2021,7 +2021,7 @@
           <a:p>
             <a:fld id="{D18B56EA-E28F-4F92-9F16-7A6F2501B303}" type="datetime8">
               <a:rPr lang="en-US" smtClean="0"/>
-              <a:t>1/7/19 3:41 PM</a:t>
+              <a:t>3/9/2019 6:35 AM</a:t>
             </a:fld>
             <a:endParaRPr lang="en-US" dirty="0"/>
           </a:p>
@@ -2202,7 +2202,7 @@
           <a:p>
             <a:fld id="{D18B56EA-E28F-4F92-9F16-7A6F2501B303}" type="datetime8">
               <a:rPr lang="en-US" smtClean="0"/>
-              <a:t>1/7/19 3:41 PM</a:t>
+              <a:t>3/9/2019 6:35 AM</a:t>
             </a:fld>
             <a:endParaRPr lang="en-US" dirty="0"/>
           </a:p>
@@ -2383,7 +2383,7 @@
           <a:p>
             <a:fld id="{D18B56EA-E28F-4F92-9F16-7A6F2501B303}" type="datetime8">
               <a:rPr lang="en-US" smtClean="0"/>
-              <a:t>1/7/19 3:41 PM</a:t>
+              <a:t>3/9/2019 6:35 AM</a:t>
             </a:fld>
             <a:endParaRPr lang="en-US" dirty="0"/>
           </a:p>
@@ -2564,7 +2564,7 @@
           <a:p>
             <a:fld id="{D18B56EA-E28F-4F92-9F16-7A6F2501B303}" type="datetime8">
               <a:rPr lang="en-US" smtClean="0"/>
-              <a:t>1/7/19 3:41 PM</a:t>
+              <a:t>3/9/2019 6:35 AM</a:t>
             </a:fld>
             <a:endParaRPr lang="en-US" dirty="0"/>
           </a:p>
@@ -2745,7 +2745,7 @@
           <a:p>
             <a:fld id="{D18B56EA-E28F-4F92-9F16-7A6F2501B303}" type="datetime8">
               <a:rPr lang="en-US" smtClean="0"/>
-              <a:t>1/7/19 3:41 PM</a:t>
+              <a:t>3/9/2019 6:35 AM</a:t>
             </a:fld>
             <a:endParaRPr lang="en-US" dirty="0"/>
           </a:p>
@@ -2926,7 +2926,7 @@
           <a:p>
             <a:fld id="{D18B56EA-E28F-4F92-9F16-7A6F2501B303}" type="datetime8">
               <a:rPr lang="en-US" smtClean="0"/>
-              <a:t>1/7/19 3:41 PM</a:t>
+              <a:t>3/9/2019 6:38 AM</a:t>
             </a:fld>
             <a:endParaRPr lang="en-US" dirty="0"/>
           </a:p>
@@ -17367,7 +17367,7 @@
               <a:rPr lang="en-US" sz="1800" dirty="0">
                 <a:latin typeface="+mj-lt"/>
               </a:rPr>
-              <a:t>SharePoint Framework</a:t>
+              <a:t>Overview of the SharePoint Framework</a:t>
             </a:r>
           </a:p>
           <a:p>
@@ -17386,7 +17386,7 @@
                 <a:latin typeface="+mj-lt"/>
                 <a:hlinkClick r:id="rId3"/>
               </a:rPr>
-              <a:t>https://docs.microsoft.com/sharepoint/dev/spfx</a:t>
+              <a:t>https://docs.microsoft.com/en-us/sharepoint/dev/spfx/sharepoint-framework-overview</a:t>
             </a:r>
             <a:endParaRPr lang="en-US" sz="1800" dirty="0">
               <a:latin typeface="+mj-lt"/>
@@ -29515,19 +29515,11 @@
           <a:p>
             <a:r>
               <a:rPr lang="en-US" sz="2000" dirty="0"/>
-              <a:t>    </a:t>
+              <a:t>    console.log('email: ', </a:t>
             </a:r>
             <a:r>
               <a:rPr lang="en-US" sz="2000" dirty="0" err="1"/>
-              <a:t>console.log</a:t>
-            </a:r>
-            <a:r>
-              <a:rPr lang="en-US" sz="2000" dirty="0"/>
-              <a:t>('email: ', </a:t>
-            </a:r>
-            <a:r>
-              <a:rPr lang="en-US" sz="2000" dirty="0" err="1"/>
-              <a:t>user.displmailayName</a:t>
+              <a:t>user.mail</a:t>
             </a:r>
             <a:r>
               <a:rPr lang="en-US" sz="2000" dirty="0"/>

</xml_diff>

<commit_message>
Update slide deck for Ex 3
</commit_message>
<xml_diff>
--- a/03 msgraphpclient.pptx
+++ b/03 msgraphpclient.pptx
@@ -278,7 +278,7 @@
               <a:rPr lang="en-US" smtClean="0">
                 <a:latin typeface="Segoe UI" pitchFamily="34" charset="0"/>
               </a:rPr>
-              <a:t>3/9/2019 6:35 AM</a:t>
+              <a:t>6/8/2019 7:51 PM</a:t>
             </a:fld>
             <a:endParaRPr lang="en-US" dirty="0">
               <a:latin typeface="Segoe UI" pitchFamily="34" charset="0"/>
@@ -575,7 +575,7 @@
           <a:p>
             <a:fld id="{D18B56EA-E28F-4F92-9F16-7A6F2501B303}" type="datetime8">
               <a:rPr lang="en-US" smtClean="0"/>
-              <a:t>3/9/2019 6:35 AM</a:t>
+              <a:t>6/8/2019 7:51 PM</a:t>
             </a:fld>
             <a:endParaRPr lang="en-US" dirty="0"/>
           </a:p>
@@ -958,7 +958,7 @@
           <a:p>
             <a:fld id="{D18B56EA-E28F-4F92-9F16-7A6F2501B303}" type="datetime8">
               <a:rPr lang="en-US" smtClean="0"/>
-              <a:t>3/9/2019 6:35 AM</a:t>
+              <a:t>6/8/2019 7:51 PM</a:t>
             </a:fld>
             <a:endParaRPr lang="en-US" dirty="0"/>
           </a:p>
@@ -1139,7 +1139,7 @@
           <a:p>
             <a:fld id="{D18B56EA-E28F-4F92-9F16-7A6F2501B303}" type="datetime8">
               <a:rPr lang="en-US" smtClean="0"/>
-              <a:t>3/9/2019 6:35 AM</a:t>
+              <a:t>6/8/2019 7:51 PM</a:t>
             </a:fld>
             <a:endParaRPr lang="en-US" dirty="0"/>
           </a:p>
@@ -1320,7 +1320,7 @@
           <a:p>
             <a:fld id="{D18B56EA-E28F-4F92-9F16-7A6F2501B303}" type="datetime8">
               <a:rPr lang="en-US" smtClean="0"/>
-              <a:t>3/9/2019 6:35 AM</a:t>
+              <a:t>6/8/2019 7:51 PM</a:t>
             </a:fld>
             <a:endParaRPr lang="en-US" dirty="0"/>
           </a:p>
@@ -1501,7 +1501,7 @@
           <a:p>
             <a:fld id="{D18B56EA-E28F-4F92-9F16-7A6F2501B303}" type="datetime8">
               <a:rPr lang="en-US" smtClean="0"/>
-              <a:t>3/9/2019 6:35 AM</a:t>
+              <a:t>6/8/2019 7:51 PM</a:t>
             </a:fld>
             <a:endParaRPr lang="en-US" dirty="0"/>
           </a:p>
@@ -1774,7 +1774,7 @@
                 <a:tabLst/>
                 <a:defRPr/>
               </a:pPr>
-              <a:t>3/9/2019</a:t>
+              <a:t>6/8/2019</a:t>
             </a:fld>
             <a:endParaRPr kumimoji="0" lang="en-US" sz="1800" b="0" i="0" u="none" strike="noStrike" kern="0" cap="none" spc="0" normalizeH="0" baseline="0" noProof="0" dirty="0">
               <a:ln>
@@ -2021,7 +2021,7 @@
           <a:p>
             <a:fld id="{D18B56EA-E28F-4F92-9F16-7A6F2501B303}" type="datetime8">
               <a:rPr lang="en-US" smtClean="0"/>
-              <a:t>3/9/2019 6:35 AM</a:t>
+              <a:t>6/8/2019 7:51 PM</a:t>
             </a:fld>
             <a:endParaRPr lang="en-US" dirty="0"/>
           </a:p>
@@ -2202,7 +2202,7 @@
           <a:p>
             <a:fld id="{D18B56EA-E28F-4F92-9F16-7A6F2501B303}" type="datetime8">
               <a:rPr lang="en-US" smtClean="0"/>
-              <a:t>3/9/2019 6:35 AM</a:t>
+              <a:t>6/8/2019 7:51 PM</a:t>
             </a:fld>
             <a:endParaRPr lang="en-US" dirty="0"/>
           </a:p>
@@ -2383,7 +2383,7 @@
           <a:p>
             <a:fld id="{D18B56EA-E28F-4F92-9F16-7A6F2501B303}" type="datetime8">
               <a:rPr lang="en-US" smtClean="0"/>
-              <a:t>3/9/2019 6:35 AM</a:t>
+              <a:t>6/8/2019 7:52 PM</a:t>
             </a:fld>
             <a:endParaRPr lang="en-US" dirty="0"/>
           </a:p>
@@ -2564,7 +2564,7 @@
           <a:p>
             <a:fld id="{D18B56EA-E28F-4F92-9F16-7A6F2501B303}" type="datetime8">
               <a:rPr lang="en-US" smtClean="0"/>
-              <a:t>3/9/2019 6:35 AM</a:t>
+              <a:t>6/8/2019 7:51 PM</a:t>
             </a:fld>
             <a:endParaRPr lang="en-US" dirty="0"/>
           </a:p>
@@ -2745,7 +2745,7 @@
           <a:p>
             <a:fld id="{D18B56EA-E28F-4F92-9F16-7A6F2501B303}" type="datetime8">
               <a:rPr lang="en-US" smtClean="0"/>
-              <a:t>3/9/2019 6:35 AM</a:t>
+              <a:t>6/8/2019 7:51 PM</a:t>
             </a:fld>
             <a:endParaRPr lang="en-US" dirty="0"/>
           </a:p>
@@ -2926,7 +2926,7 @@
           <a:p>
             <a:fld id="{D18B56EA-E28F-4F92-9F16-7A6F2501B303}" type="datetime8">
               <a:rPr lang="en-US" smtClean="0"/>
-              <a:t>3/9/2019 6:38 AM</a:t>
+              <a:t>6/8/2019 7:51 PM</a:t>
             </a:fld>
             <a:endParaRPr lang="en-US" dirty="0"/>
           </a:p>
@@ -16006,7 +16006,12 @@
             <p:ph type="body" sz="quarter" idx="10"/>
           </p:nvPr>
         </p:nvSpPr>
-        <p:spPr/>
+        <p:spPr>
+          <a:xfrm>
+            <a:off x="464400" y="1178951"/>
+            <a:ext cx="11575200" cy="5522637"/>
+          </a:xfrm>
+        </p:spPr>
         <p:txBody>
           <a:bodyPr/>
           <a:lstStyle/>
@@ -16125,6 +16130,20 @@
             <a:r>
               <a:rPr lang="en-US" sz="1600" dirty="0"/>
               <a:t>": true,</a:t>
+            </a:r>
+          </a:p>
+          <a:p>
+            <a:r>
+              <a:rPr lang="en-US" sz="1600" dirty="0"/>
+              <a:t>    "</a:t>
+            </a:r>
+            <a:r>
+              <a:rPr lang="en-US" sz="1600" dirty="0" err="1"/>
+              <a:t>isDomainIsolated</a:t>
+            </a:r>
+            <a:r>
+              <a:rPr lang="en-US" sz="1600" dirty="0"/>
+              <a:t>": false,</a:t>
             </a:r>
           </a:p>
           <a:p>
@@ -16532,10 +16551,10 @@
       </p:sp>
       <p:pic>
         <p:nvPicPr>
-          <p:cNvPr id="9" name="Picture 8">
+          <p:cNvPr id="4" name="Picture 3">
             <a:extLst>
               <a:ext uri="{FF2B5EF4-FFF2-40B4-BE49-F238E27FC236}">
-                <a16:creationId xmlns:a16="http://schemas.microsoft.com/office/drawing/2014/main" id="{BA3DED1D-5B65-9547-8D2B-396BE49DBF02}"/>
+                <a16:creationId xmlns:a16="http://schemas.microsoft.com/office/drawing/2014/main" id="{953F9434-FB8C-40E3-8E03-91AA5C568AC7}"/>
               </a:ext>
             </a:extLst>
           </p:cNvPr>
@@ -16552,20 +16571,25 @@
         </p:blipFill>
         <p:spPr>
           <a:xfrm>
-            <a:off x="8493668" y="1253299"/>
-            <a:ext cx="2339612" cy="5213191"/>
+            <a:off x="468149" y="1385455"/>
+            <a:ext cx="8134429" cy="5002675"/>
           </a:xfrm>
           <a:prstGeom prst="rect">
             <a:avLst/>
           </a:prstGeom>
+          <a:ln>
+            <a:solidFill>
+              <a:schemeClr val="accent1"/>
+            </a:solidFill>
+          </a:ln>
         </p:spPr>
       </p:pic>
       <p:pic>
         <p:nvPicPr>
-          <p:cNvPr id="7" name="Picture 6">
+          <p:cNvPr id="6" name="Picture 5">
             <a:extLst>
               <a:ext uri="{FF2B5EF4-FFF2-40B4-BE49-F238E27FC236}">
-                <a16:creationId xmlns:a16="http://schemas.microsoft.com/office/drawing/2014/main" id="{B85CD8D1-9D2D-7242-9E40-C612F55FBA26}"/>
+                <a16:creationId xmlns:a16="http://schemas.microsoft.com/office/drawing/2014/main" id="{B0258B88-2C8E-42A1-B959-50F584900B1A}"/>
               </a:ext>
             </a:extLst>
           </p:cNvPr>
@@ -16582,12 +16606,17 @@
         </p:blipFill>
         <p:spPr>
           <a:xfrm>
-            <a:off x="1259953" y="1716690"/>
-            <a:ext cx="6438900" cy="5041900"/>
+            <a:off x="9185528" y="1385455"/>
+            <a:ext cx="2270957" cy="4976291"/>
           </a:xfrm>
           <a:prstGeom prst="rect">
             <a:avLst/>
           </a:prstGeom>
+          <a:ln>
+            <a:solidFill>
+              <a:schemeClr val="accent1"/>
+            </a:solidFill>
+          </a:ln>
         </p:spPr>
       </p:pic>
     </p:spTree>

</xml_diff>